<commit_message>
Added lexicon dictionary to classifier
</commit_message>
<xml_diff>
--- a/SentimentAnalysis/Lab1+2.pptx
+++ b/SentimentAnalysis/Lab1+2.pptx
@@ -8106,16 +8106,26 @@
           </a:p>
           <a:p>
             <a:r>
-              <a:rPr lang="en-US" sz="2800">
+              <a:rPr lang="en-US" sz="2800" dirty="0">
                 <a:solidFill>
                   <a:schemeClr val="tx1"/>
                 </a:solidFill>
                 <a:effectLst/>
                 <a:latin typeface="Gotham SSm A"/>
               </a:rPr>
-              <a:t>Language detecting</a:t>
-            </a:r>
-            <a:endParaRPr lang="en-US" sz="2800" b="0" i="0" dirty="0">
+              <a:t>Language detecting and removing </a:t>
+            </a:r>
+            <a:r>
+              <a:rPr lang="en-US" sz="2800" dirty="0" err="1">
+                <a:solidFill>
+                  <a:schemeClr val="tx1"/>
+                </a:solidFill>
+                <a:effectLst/>
+                <a:latin typeface="Gotham SSm A"/>
+              </a:rPr>
+              <a:t>stopwords</a:t>
+            </a:r>
+            <a:endParaRPr lang="en-US" sz="2800" dirty="0">
               <a:solidFill>
                 <a:schemeClr val="tx1"/>
               </a:solidFill>
@@ -8132,27 +8142,19 @@
                 <a:effectLst/>
                 <a:latin typeface="Gotham SSm A"/>
               </a:rPr>
-              <a:t>Vectorizing training and </a:t>
-            </a:r>
-            <a:r>
-              <a:rPr lang="en-US" sz="2800" dirty="0">
+              <a:t>Converting words given lexicon dictionary</a:t>
+            </a:r>
+          </a:p>
+          <a:p>
+            <a:r>
+              <a:rPr lang="en-US" sz="2800" b="0" i="0" dirty="0">
                 <a:solidFill>
                   <a:schemeClr val="tx1"/>
                 </a:solidFill>
                 <a:effectLst/>
                 <a:latin typeface="Gotham SSm A"/>
               </a:rPr>
-              <a:t>test </a:t>
-            </a:r>
-            <a:r>
-              <a:rPr lang="en-US" sz="2800" b="0" i="0" dirty="0">
-                <a:solidFill>
-                  <a:schemeClr val="tx1"/>
-                </a:solidFill>
-                <a:effectLst/>
-                <a:latin typeface="Gotham SSm A"/>
-              </a:rPr>
-              <a:t>data</a:t>
+              <a:t>Vectorizing data</a:t>
             </a:r>
           </a:p>
           <a:p>
@@ -8203,7 +8205,7 @@
         </p:blipFill>
         <p:spPr>
           <a:xfrm>
-            <a:off x="7323667" y="1580050"/>
+            <a:off x="7583724" y="1580050"/>
             <a:ext cx="4168615" cy="1773720"/>
           </a:xfrm>
           <a:prstGeom prst="rect">

</xml_diff>